<commit_message>
4.2.2 zum Lesen ;)
</commit_message>
<xml_diff>
--- a/doc/content/hauptteil/systemEntwurf/res/comMod.pptx
+++ b/doc/content/hauptteil/systemEntwurf/res/comMod.pptx
@@ -243,7 +243,7 @@
           <a:p>
             <a:fld id="{2ADC3223-311F-4C15-893C-16F9C0ED0ABB}" type="datetimeFigureOut">
               <a:rPr lang="de-DE" smtClean="0"/>
-              <a:t>19.10.2019</a:t>
+              <a:t>26.10.2019</a:t>
             </a:fld>
             <a:endParaRPr lang="de-DE"/>
           </a:p>
@@ -413,7 +413,7 @@
           <a:p>
             <a:fld id="{2ADC3223-311F-4C15-893C-16F9C0ED0ABB}" type="datetimeFigureOut">
               <a:rPr lang="de-DE" smtClean="0"/>
-              <a:t>19.10.2019</a:t>
+              <a:t>26.10.2019</a:t>
             </a:fld>
             <a:endParaRPr lang="de-DE"/>
           </a:p>
@@ -593,7 +593,7 @@
           <a:p>
             <a:fld id="{2ADC3223-311F-4C15-893C-16F9C0ED0ABB}" type="datetimeFigureOut">
               <a:rPr lang="de-DE" smtClean="0"/>
-              <a:t>19.10.2019</a:t>
+              <a:t>26.10.2019</a:t>
             </a:fld>
             <a:endParaRPr lang="de-DE"/>
           </a:p>
@@ -763,7 +763,7 @@
           <a:p>
             <a:fld id="{2ADC3223-311F-4C15-893C-16F9C0ED0ABB}" type="datetimeFigureOut">
               <a:rPr lang="de-DE" smtClean="0"/>
-              <a:t>19.10.2019</a:t>
+              <a:t>26.10.2019</a:t>
             </a:fld>
             <a:endParaRPr lang="de-DE"/>
           </a:p>
@@ -1007,7 +1007,7 @@
           <a:p>
             <a:fld id="{2ADC3223-311F-4C15-893C-16F9C0ED0ABB}" type="datetimeFigureOut">
               <a:rPr lang="de-DE" smtClean="0"/>
-              <a:t>19.10.2019</a:t>
+              <a:t>26.10.2019</a:t>
             </a:fld>
             <a:endParaRPr lang="de-DE"/>
           </a:p>
@@ -1239,7 +1239,7 @@
           <a:p>
             <a:fld id="{2ADC3223-311F-4C15-893C-16F9C0ED0ABB}" type="datetimeFigureOut">
               <a:rPr lang="de-DE" smtClean="0"/>
-              <a:t>19.10.2019</a:t>
+              <a:t>26.10.2019</a:t>
             </a:fld>
             <a:endParaRPr lang="de-DE"/>
           </a:p>
@@ -1606,7 +1606,7 @@
           <a:p>
             <a:fld id="{2ADC3223-311F-4C15-893C-16F9C0ED0ABB}" type="datetimeFigureOut">
               <a:rPr lang="de-DE" smtClean="0"/>
-              <a:t>19.10.2019</a:t>
+              <a:t>26.10.2019</a:t>
             </a:fld>
             <a:endParaRPr lang="de-DE"/>
           </a:p>
@@ -1724,7 +1724,7 @@
           <a:p>
             <a:fld id="{2ADC3223-311F-4C15-893C-16F9C0ED0ABB}" type="datetimeFigureOut">
               <a:rPr lang="de-DE" smtClean="0"/>
-              <a:t>19.10.2019</a:t>
+              <a:t>26.10.2019</a:t>
             </a:fld>
             <a:endParaRPr lang="de-DE"/>
           </a:p>
@@ -1819,7 +1819,7 @@
           <a:p>
             <a:fld id="{2ADC3223-311F-4C15-893C-16F9C0ED0ABB}" type="datetimeFigureOut">
               <a:rPr lang="de-DE" smtClean="0"/>
-              <a:t>19.10.2019</a:t>
+              <a:t>26.10.2019</a:t>
             </a:fld>
             <a:endParaRPr lang="de-DE"/>
           </a:p>
@@ -2096,7 +2096,7 @@
           <a:p>
             <a:fld id="{2ADC3223-311F-4C15-893C-16F9C0ED0ABB}" type="datetimeFigureOut">
               <a:rPr lang="de-DE" smtClean="0"/>
-              <a:t>19.10.2019</a:t>
+              <a:t>26.10.2019</a:t>
             </a:fld>
             <a:endParaRPr lang="de-DE"/>
           </a:p>
@@ -2353,7 +2353,7 @@
           <a:p>
             <a:fld id="{2ADC3223-311F-4C15-893C-16F9C0ED0ABB}" type="datetimeFigureOut">
               <a:rPr lang="de-DE" smtClean="0"/>
-              <a:t>19.10.2019</a:t>
+              <a:t>26.10.2019</a:t>
             </a:fld>
             <a:endParaRPr lang="de-DE"/>
           </a:p>
@@ -2566,7 +2566,7 @@
           <a:p>
             <a:fld id="{2ADC3223-311F-4C15-893C-16F9C0ED0ABB}" type="datetimeFigureOut">
               <a:rPr lang="de-DE" smtClean="0"/>
-              <a:t>19.10.2019</a:t>
+              <a:t>26.10.2019</a:t>
             </a:fld>
             <a:endParaRPr lang="de-DE"/>
           </a:p>
@@ -3475,9 +3475,10 @@
           <a:lstStyle/>
           <a:p>
             <a:r>
-              <a:rPr lang="de-DE" sz="2081" dirty="0"/>
-              <a:t>OPCUA</a:t>
-            </a:r>
+              <a:rPr lang="de-DE" sz="2081"/>
+              <a:t>OPC UA</a:t>
+            </a:r>
+            <a:endParaRPr lang="de-DE" sz="2081" dirty="0"/>
           </a:p>
           <a:p>
             <a:r>
@@ -3908,7 +3909,7 @@
         <p:spPr>
           <a:xfrm>
             <a:off x="703596" y="479348"/>
-            <a:ext cx="984779" cy="732765"/>
+            <a:ext cx="1013898" cy="732765"/>
           </a:xfrm>
           <a:prstGeom prst="rect">
             <a:avLst/>
@@ -3923,7 +3924,7 @@
           <a:p>
             <a:r>
               <a:rPr lang="de-DE" sz="2081" dirty="0"/>
-              <a:t>OPCUA</a:t>
+              <a:t>OPC UA</a:t>
             </a:r>
           </a:p>
           <a:p>
@@ -4875,7 +4876,7 @@
         <p:spPr>
           <a:xfrm>
             <a:off x="2022129" y="540653"/>
-            <a:ext cx="883127" cy="380425"/>
+            <a:ext cx="937629" cy="380425"/>
           </a:xfrm>
           <a:prstGeom prst="rect">
             <a:avLst/>
@@ -4889,7 +4890,7 @@
           <a:p>
             <a:r>
               <a:rPr lang="de-DE" sz="1872" dirty="0"/>
-              <a:t>OPCUA</a:t>
+              <a:t>OPC UA</a:t>
             </a:r>
           </a:p>
         </p:txBody>
@@ -5083,7 +5084,7 @@
         <p:spPr>
           <a:xfrm>
             <a:off x="703597" y="1768638"/>
-            <a:ext cx="984779" cy="732765"/>
+            <a:ext cx="1034397" cy="732765"/>
           </a:xfrm>
           <a:prstGeom prst="rect">
             <a:avLst/>
@@ -5098,7 +5099,7 @@
           <a:p>
             <a:r>
               <a:rPr lang="de-DE" sz="2081" dirty="0"/>
-              <a:t>OPCUA</a:t>
+              <a:t>OPC UA</a:t>
             </a:r>
           </a:p>
           <a:p>
@@ -5448,7 +5449,7 @@
         <p:spPr>
           <a:xfrm>
             <a:off x="700438" y="3117936"/>
-            <a:ext cx="984779" cy="732765"/>
+            <a:ext cx="1037557" cy="732765"/>
           </a:xfrm>
           <a:prstGeom prst="rect">
             <a:avLst/>
@@ -5463,7 +5464,7 @@
           <a:p>
             <a:r>
               <a:rPr lang="de-DE" sz="2081" dirty="0"/>
-              <a:t>OPCUA</a:t>
+              <a:t>OPC UA</a:t>
             </a:r>
           </a:p>
           <a:p>
@@ -5813,7 +5814,7 @@
         <p:spPr>
           <a:xfrm>
             <a:off x="703597" y="5411895"/>
-            <a:ext cx="984779" cy="732765"/>
+            <a:ext cx="1047679" cy="732765"/>
           </a:xfrm>
           <a:prstGeom prst="rect">
             <a:avLst/>
@@ -5828,7 +5829,7 @@
           <a:p>
             <a:r>
               <a:rPr lang="de-DE" sz="2081" dirty="0"/>
-              <a:t>OPCUA</a:t>
+              <a:t>OPC UA</a:t>
             </a:r>
           </a:p>
           <a:p>
@@ -6039,7 +6040,7 @@
         <p:spPr>
           <a:xfrm>
             <a:off x="2010693" y="1853842"/>
-            <a:ext cx="883127" cy="380425"/>
+            <a:ext cx="937629" cy="380425"/>
           </a:xfrm>
           <a:prstGeom prst="rect">
             <a:avLst/>
@@ -6053,7 +6054,7 @@
           <a:p>
             <a:r>
               <a:rPr lang="de-DE" sz="1872" dirty="0"/>
-              <a:t>OPCUA</a:t>
+              <a:t>OPC UA</a:t>
             </a:r>
           </a:p>
         </p:txBody>
@@ -6073,7 +6074,7 @@
         <p:spPr>
           <a:xfrm>
             <a:off x="2022130" y="3167644"/>
-            <a:ext cx="883127" cy="380425"/>
+            <a:ext cx="937629" cy="380425"/>
           </a:xfrm>
           <a:prstGeom prst="rect">
             <a:avLst/>
@@ -6087,7 +6088,7 @@
           <a:p>
             <a:r>
               <a:rPr lang="de-DE" sz="1872" dirty="0"/>
-              <a:t>OPCUA</a:t>
+              <a:t>OPC UA</a:t>
             </a:r>
           </a:p>
         </p:txBody>
@@ -6107,7 +6108,7 @@
         <p:spPr>
           <a:xfrm>
             <a:off x="2021247" y="5496211"/>
-            <a:ext cx="883127" cy="380425"/>
+            <a:ext cx="937629" cy="380425"/>
           </a:xfrm>
           <a:prstGeom prst="rect">
             <a:avLst/>
@@ -6121,7 +6122,7 @@
           <a:p>
             <a:r>
               <a:rPr lang="de-DE" sz="1872" dirty="0"/>
-              <a:t>OPCUA</a:t>
+              <a:t>OPC UA</a:t>
             </a:r>
           </a:p>
         </p:txBody>

</xml_diff>